<commit_message>
add react app readme file and scrennshots
</commit_message>
<xml_diff>
--- a/docs/school managment system.pptx
+++ b/docs/school managment system.pptx
@@ -11,6 +11,7 @@
     <p:sldId id="259" r:id="rId5"/>
     <p:sldId id="260" r:id="rId6"/>
     <p:sldId id="261" r:id="rId7"/>
+    <p:sldId id="262" r:id="rId8"/>
   </p:sldIdLst>
   <p:sldSz cx="12192000" cy="6858000"/>
   <p:notesSz cx="6858000" cy="9144000"/>
@@ -3177,7 +3178,7 @@
         <a:lstStyle/>
         <a:p>
           <a:r>
-            <a:rPr lang="en-US"/>
+            <a:rPr lang="en-US" dirty="0"/>
             <a:t>Proficiency in Node.js and its ecosystem of libraries and tools</a:t>
           </a:r>
         </a:p>
@@ -3321,7 +3322,7 @@
         <a:lstStyle/>
         <a:p>
           <a:r>
-            <a:rPr lang="en-US"/>
+            <a:rPr lang="en-US" dirty="0"/>
             <a:t>Understanding of state management using Redux</a:t>
           </a:r>
         </a:p>
@@ -3358,13 +3359,8 @@
         <a:p>
           <a:r>
             <a:rPr lang="en-US" dirty="0"/>
-            <a:t>Project management skills, including task planning, </a:t>
+            <a:t>Project management skills, including task planning, time estimation.</a:t>
           </a:r>
-          <a:r>
-            <a:rPr lang="en-US"/>
-            <a:t>time estimation.</a:t>
-          </a:r>
-          <a:endParaRPr lang="en-US" dirty="0"/>
         </a:p>
       </dgm:t>
     </dgm:pt>
@@ -4450,7 +4446,7 @@
             <a:buNone/>
           </a:pPr>
           <a:r>
-            <a:rPr lang="en-US" sz="1900" kern="1200"/>
+            <a:rPr lang="en-US" sz="1900" kern="1200" dirty="0"/>
             <a:t>Proficiency in Node.js and its ecosystem of libraries and tools</a:t>
           </a:r>
         </a:p>
@@ -5046,7 +5042,7 @@
             <a:buNone/>
           </a:pPr>
           <a:r>
-            <a:rPr lang="en-US" sz="1900" kern="1200"/>
+            <a:rPr lang="en-US" sz="1900" kern="1200" dirty="0"/>
             <a:t>Understanding of state management using Redux</a:t>
           </a:r>
         </a:p>
@@ -5196,13 +5192,8 @@
           </a:pPr>
           <a:r>
             <a:rPr lang="en-US" sz="1900" kern="1200" dirty="0"/>
-            <a:t>Project management skills, including task planning, </a:t>
+            <a:t>Project management skills, including task planning, time estimation.</a:t>
           </a:r>
-          <a:r>
-            <a:rPr lang="en-US" sz="1900" kern="1200"/>
-            <a:t>time estimation.</a:t>
-          </a:r>
-          <a:endParaRPr lang="en-US" sz="1900" kern="1200" dirty="0"/>
         </a:p>
       </dsp:txBody>
       <dsp:txXfrm>
@@ -9573,7 +9564,7 @@
           <a:p>
             <a:fld id="{BBDF3694-664D-4471-B86B-A3183E7D5900}" type="datetimeFigureOut">
               <a:rPr lang="en-US" smtClean="0"/>
-              <a:t>3/31/2023</a:t>
+              <a:t>4/10/2023</a:t>
             </a:fld>
             <a:endParaRPr lang="en-US"/>
           </a:p>
@@ -9773,7 +9764,7 @@
           <a:p>
             <a:fld id="{BBDF3694-664D-4471-B86B-A3183E7D5900}" type="datetimeFigureOut">
               <a:rPr lang="en-US" smtClean="0"/>
-              <a:t>3/31/2023</a:t>
+              <a:t>4/10/2023</a:t>
             </a:fld>
             <a:endParaRPr lang="en-US"/>
           </a:p>
@@ -9983,7 +9974,7 @@
           <a:p>
             <a:fld id="{BBDF3694-664D-4471-B86B-A3183E7D5900}" type="datetimeFigureOut">
               <a:rPr lang="en-US" smtClean="0"/>
-              <a:t>3/31/2023</a:t>
+              <a:t>4/10/2023</a:t>
             </a:fld>
             <a:endParaRPr lang="en-US"/>
           </a:p>
@@ -10183,7 +10174,7 @@
           <a:p>
             <a:fld id="{BBDF3694-664D-4471-B86B-A3183E7D5900}" type="datetimeFigureOut">
               <a:rPr lang="en-US" smtClean="0"/>
-              <a:t>3/31/2023</a:t>
+              <a:t>4/10/2023</a:t>
             </a:fld>
             <a:endParaRPr lang="en-US"/>
           </a:p>
@@ -10459,7 +10450,7 @@
           <a:p>
             <a:fld id="{BBDF3694-664D-4471-B86B-A3183E7D5900}" type="datetimeFigureOut">
               <a:rPr lang="en-US" smtClean="0"/>
-              <a:t>3/31/2023</a:t>
+              <a:t>4/10/2023</a:t>
             </a:fld>
             <a:endParaRPr lang="en-US"/>
           </a:p>
@@ -10727,7 +10718,7 @@
           <a:p>
             <a:fld id="{BBDF3694-664D-4471-B86B-A3183E7D5900}" type="datetimeFigureOut">
               <a:rPr lang="en-US" smtClean="0"/>
-              <a:t>3/31/2023</a:t>
+              <a:t>4/10/2023</a:t>
             </a:fld>
             <a:endParaRPr lang="en-US"/>
           </a:p>
@@ -11142,7 +11133,7 @@
           <a:p>
             <a:fld id="{BBDF3694-664D-4471-B86B-A3183E7D5900}" type="datetimeFigureOut">
               <a:rPr lang="en-US" smtClean="0"/>
-              <a:t>3/31/2023</a:t>
+              <a:t>4/10/2023</a:t>
             </a:fld>
             <a:endParaRPr lang="en-US"/>
           </a:p>
@@ -11284,7 +11275,7 @@
           <a:p>
             <a:fld id="{BBDF3694-664D-4471-B86B-A3183E7D5900}" type="datetimeFigureOut">
               <a:rPr lang="en-US" smtClean="0"/>
-              <a:t>3/31/2023</a:t>
+              <a:t>4/10/2023</a:t>
             </a:fld>
             <a:endParaRPr lang="en-US"/>
           </a:p>
@@ -11397,7 +11388,7 @@
           <a:p>
             <a:fld id="{BBDF3694-664D-4471-B86B-A3183E7D5900}" type="datetimeFigureOut">
               <a:rPr lang="en-US" smtClean="0"/>
-              <a:t>3/31/2023</a:t>
+              <a:t>4/10/2023</a:t>
             </a:fld>
             <a:endParaRPr lang="en-US"/>
           </a:p>
@@ -11710,7 +11701,7 @@
           <a:p>
             <a:fld id="{BBDF3694-664D-4471-B86B-A3183E7D5900}" type="datetimeFigureOut">
               <a:rPr lang="en-US" smtClean="0"/>
-              <a:t>3/31/2023</a:t>
+              <a:t>4/10/2023</a:t>
             </a:fld>
             <a:endParaRPr lang="en-US"/>
           </a:p>
@@ -11999,7 +11990,7 @@
           <a:p>
             <a:fld id="{BBDF3694-664D-4471-B86B-A3183E7D5900}" type="datetimeFigureOut">
               <a:rPr lang="en-US" smtClean="0"/>
-              <a:t>3/31/2023</a:t>
+              <a:t>4/10/2023</a:t>
             </a:fld>
             <a:endParaRPr lang="en-US"/>
           </a:p>
@@ -12242,7 +12233,7 @@
           <a:p>
             <a:fld id="{BBDF3694-664D-4471-B86B-A3183E7D5900}" type="datetimeFigureOut">
               <a:rPr lang="en-US" smtClean="0"/>
-              <a:t>3/31/2023</a:t>
+              <a:t>4/10/2023</a:t>
             </a:fld>
             <a:endParaRPr lang="en-US"/>
           </a:p>
@@ -14618,6 +14609,341 @@
 </p:sld>
 </file>
 
+<file path=ppt/slides/slide7.xml><?xml version="1.0" encoding="utf-8"?>
+<p:sld xmlns:a="http://schemas.openxmlformats.org/drawingml/2006/main" xmlns:r="http://schemas.openxmlformats.org/officeDocument/2006/relationships" xmlns:p="http://schemas.openxmlformats.org/presentationml/2006/main">
+  <p:cSld>
+    <p:bg>
+      <p:bgPr>
+        <a:solidFill>
+          <a:schemeClr val="bg1"/>
+        </a:solidFill>
+        <a:effectLst/>
+      </p:bgPr>
+    </p:bg>
+    <p:spTree>
+      <p:nvGrpSpPr>
+        <p:cNvPr id="1" name=""/>
+        <p:cNvGrpSpPr/>
+        <p:nvPr/>
+      </p:nvGrpSpPr>
+      <p:grpSpPr>
+        <a:xfrm>
+          <a:off x="0" y="0"/>
+          <a:ext cx="0" cy="0"/>
+          <a:chOff x="0" y="0"/>
+          <a:chExt cx="0" cy="0"/>
+        </a:xfrm>
+      </p:grpSpPr>
+      <p:sp useBgFill="1">
+        <p:nvSpPr>
+          <p:cNvPr id="8" name="Rectangle 7">
+            <a:extLst>
+              <a:ext uri="{FF2B5EF4-FFF2-40B4-BE49-F238E27FC236}">
+                <a16:creationId xmlns:a16="http://schemas.microsoft.com/office/drawing/2014/main" id="{1BB867FF-FC45-48F7-8104-F89BE54909F1}"/>
+              </a:ext>
+              <a:ext uri="{C183D7F6-B498-43B3-948B-1728B52AA6E4}">
+                <adec:decorative xmlns:adec="http://schemas.microsoft.com/office/drawing/2017/decorative" val="1"/>
+              </a:ext>
+            </a:extLst>
+          </p:cNvPr>
+          <p:cNvSpPr>
+            <a:spLocks noGrp="1" noRot="1" noChangeAspect="1" noMove="1" noResize="1" noEditPoints="1" noAdjustHandles="1" noChangeArrowheads="1" noChangeShapeType="1" noTextEdit="1"/>
+          </p:cNvSpPr>
+          <p:nvPr>
+            <p:extLst>
+              <p:ext uri="{386F3935-93C4-4BCD-93E2-E3B085C9AB24}">
+                <p16:designElem xmlns:p16="http://schemas.microsoft.com/office/powerpoint/2015/main" val="1"/>
+              </p:ext>
+            </p:extLst>
+          </p:nvPr>
+        </p:nvSpPr>
+        <p:spPr>
+          <a:xfrm>
+            <a:off x="3048" y="0"/>
+            <a:ext cx="12188952" cy="6858000"/>
+          </a:xfrm>
+          <a:prstGeom prst="rect">
+            <a:avLst/>
+          </a:prstGeom>
+          <a:ln>
+            <a:noFill/>
+          </a:ln>
+        </p:spPr>
+        <p:style>
+          <a:lnRef idx="2">
+            <a:schemeClr val="accent1">
+              <a:shade val="50000"/>
+            </a:schemeClr>
+          </a:lnRef>
+          <a:fillRef idx="1">
+            <a:schemeClr val="accent1"/>
+          </a:fillRef>
+          <a:effectRef idx="0">
+            <a:schemeClr val="accent1"/>
+          </a:effectRef>
+          <a:fontRef idx="minor">
+            <a:schemeClr val="lt1"/>
+          </a:fontRef>
+        </p:style>
+        <p:txBody>
+          <a:bodyPr rtlCol="0" anchor="ctr"/>
+          <a:lstStyle/>
+          <a:p>
+            <a:pPr algn="ctr"/>
+            <a:endParaRPr lang="en-US"/>
+          </a:p>
+        </p:txBody>
+      </p:sp>
+      <p:sp>
+        <p:nvSpPr>
+          <p:cNvPr id="10" name="Freeform: Shape 9">
+            <a:extLst>
+              <a:ext uri="{FF2B5EF4-FFF2-40B4-BE49-F238E27FC236}">
+                <a16:creationId xmlns:a16="http://schemas.microsoft.com/office/drawing/2014/main" id="{8BB56887-D0D5-4F0C-9E19-7247EB83C8B7}"/>
+              </a:ext>
+              <a:ext uri="{C183D7F6-B498-43B3-948B-1728B52AA6E4}">
+                <adec:decorative xmlns:adec="http://schemas.microsoft.com/office/drawing/2017/decorative" val="1"/>
+              </a:ext>
+            </a:extLst>
+          </p:cNvPr>
+          <p:cNvSpPr>
+            <a:spLocks noGrp="1" noRot="1" noChangeAspect="1" noMove="1" noResize="1" noEditPoints="1" noAdjustHandles="1" noChangeArrowheads="1" noChangeShapeType="1" noTextEdit="1"/>
+          </p:cNvSpPr>
+          <p:nvPr>
+            <p:extLst>
+              <p:ext uri="{386F3935-93C4-4BCD-93E2-E3B085C9AB24}">
+                <p16:designElem xmlns:p16="http://schemas.microsoft.com/office/powerpoint/2015/main" val="1"/>
+              </p:ext>
+            </p:extLst>
+          </p:nvPr>
+        </p:nvSpPr>
+        <p:spPr>
+          <a:xfrm>
+            <a:off x="10208695" y="1"/>
+            <a:ext cx="1135066" cy="477997"/>
+          </a:xfrm>
+          <a:custGeom>
+            <a:avLst/>
+            <a:gdLst>
+              <a:gd name="connsiteX0" fmla="*/ 0 w 1135066"/>
+              <a:gd name="connsiteY0" fmla="*/ 0 h 477997"/>
+              <a:gd name="connsiteX1" fmla="*/ 1135066 w 1135066"/>
+              <a:gd name="connsiteY1" fmla="*/ 0 h 477997"/>
+              <a:gd name="connsiteX2" fmla="*/ 1133370 w 1135066"/>
+              <a:gd name="connsiteY2" fmla="*/ 16827 h 477997"/>
+              <a:gd name="connsiteX3" fmla="*/ 567533 w 1135066"/>
+              <a:gd name="connsiteY3" fmla="*/ 477997 h 477997"/>
+              <a:gd name="connsiteX4" fmla="*/ 1696 w 1135066"/>
+              <a:gd name="connsiteY4" fmla="*/ 16827 h 477997"/>
+            </a:gdLst>
+            <a:ahLst/>
+            <a:cxnLst>
+              <a:cxn ang="0">
+                <a:pos x="connsiteX0" y="connsiteY0"/>
+              </a:cxn>
+              <a:cxn ang="0">
+                <a:pos x="connsiteX1" y="connsiteY1"/>
+              </a:cxn>
+              <a:cxn ang="0">
+                <a:pos x="connsiteX2" y="connsiteY2"/>
+              </a:cxn>
+              <a:cxn ang="0">
+                <a:pos x="connsiteX3" y="connsiteY3"/>
+              </a:cxn>
+              <a:cxn ang="0">
+                <a:pos x="connsiteX4" y="connsiteY4"/>
+              </a:cxn>
+            </a:cxnLst>
+            <a:rect l="l" t="t" r="r" b="b"/>
+            <a:pathLst>
+              <a:path w="1135066" h="477997">
+                <a:moveTo>
+                  <a:pt x="0" y="0"/>
+                </a:moveTo>
+                <a:lnTo>
+                  <a:pt x="1135066" y="0"/>
+                </a:lnTo>
+                <a:lnTo>
+                  <a:pt x="1133370" y="16827"/>
+                </a:lnTo>
+                <a:cubicBezTo>
+                  <a:pt x="1079514" y="280016"/>
+                  <a:pt x="846644" y="477997"/>
+                  <a:pt x="567533" y="477997"/>
+                </a:cubicBezTo>
+                <a:cubicBezTo>
+                  <a:pt x="288422" y="477997"/>
+                  <a:pt x="55552" y="280016"/>
+                  <a:pt x="1696" y="16827"/>
+                </a:cubicBezTo>
+                <a:close/>
+              </a:path>
+            </a:pathLst>
+          </a:custGeom>
+          <a:solidFill>
+            <a:schemeClr val="accent4"/>
+          </a:solidFill>
+          <a:ln>
+            <a:noFill/>
+          </a:ln>
+        </p:spPr>
+        <p:style>
+          <a:lnRef idx="2">
+            <a:schemeClr val="accent1">
+              <a:shade val="50000"/>
+            </a:schemeClr>
+          </a:lnRef>
+          <a:fillRef idx="1">
+            <a:schemeClr val="accent1"/>
+          </a:fillRef>
+          <a:effectRef idx="0">
+            <a:schemeClr val="accent1"/>
+          </a:effectRef>
+          <a:fontRef idx="minor">
+            <a:schemeClr val="lt1"/>
+          </a:fontRef>
+        </p:style>
+        <p:txBody>
+          <a:bodyPr wrap="square" rtlCol="0" anchor="ctr">
+            <a:noAutofit/>
+          </a:bodyPr>
+          <a:lstStyle/>
+          <a:p>
+            <a:pPr algn="ctr"/>
+            <a:endParaRPr lang="en-US"/>
+          </a:p>
+        </p:txBody>
+      </p:sp>
+      <p:sp>
+        <p:nvSpPr>
+          <p:cNvPr id="12" name="Arc 11">
+            <a:extLst>
+              <a:ext uri="{FF2B5EF4-FFF2-40B4-BE49-F238E27FC236}">
+                <a16:creationId xmlns:a16="http://schemas.microsoft.com/office/drawing/2014/main" id="{081E4A58-353D-44AE-B2FC-2A74E2E400F7}"/>
+              </a:ext>
+              <a:ext uri="{C183D7F6-B498-43B3-948B-1728B52AA6E4}">
+                <adec:decorative xmlns:adec="http://schemas.microsoft.com/office/drawing/2017/decorative" val="1"/>
+              </a:ext>
+            </a:extLst>
+          </p:cNvPr>
+          <p:cNvSpPr>
+            <a:spLocks noGrp="1" noRot="1" noChangeAspect="1" noMove="1" noResize="1" noEditPoints="1" noAdjustHandles="1" noChangeArrowheads="1" noChangeShapeType="1" noTextEdit="1"/>
+          </p:cNvSpPr>
+          <p:nvPr>
+            <p:extLst>
+              <p:ext uri="{386F3935-93C4-4BCD-93E2-E3B085C9AB24}">
+                <p16:designElem xmlns:p16="http://schemas.microsoft.com/office/powerpoint/2015/main" val="1"/>
+              </p:ext>
+            </p:extLst>
+          </p:nvPr>
+        </p:nvSpPr>
+        <p:spPr>
+          <a:xfrm rot="5400000" flipV="1">
+            <a:off x="555710" y="2183223"/>
+            <a:ext cx="4083433" cy="4083433"/>
+          </a:xfrm>
+          <a:prstGeom prst="arc">
+            <a:avLst/>
+          </a:prstGeom>
+          <a:ln w="127000" cap="rnd">
+            <a:solidFill>
+              <a:schemeClr val="accent4"/>
+            </a:solidFill>
+            <a:prstDash val="dash"/>
+          </a:ln>
+        </p:spPr>
+        <p:style>
+          <a:lnRef idx="1">
+            <a:schemeClr val="accent1"/>
+          </a:lnRef>
+          <a:fillRef idx="0">
+            <a:schemeClr val="accent1"/>
+          </a:fillRef>
+          <a:effectRef idx="0">
+            <a:schemeClr val="accent1"/>
+          </a:effectRef>
+          <a:fontRef idx="minor">
+            <a:schemeClr val="tx1"/>
+          </a:fontRef>
+        </p:style>
+        <p:txBody>
+          <a:bodyPr rtlCol="0" anchor="ctr"/>
+          <a:lstStyle/>
+          <a:p>
+            <a:pPr algn="ctr"/>
+            <a:endParaRPr lang="en-US" dirty="0"/>
+          </a:p>
+        </p:txBody>
+      </p:sp>
+      <p:sp>
+        <p:nvSpPr>
+          <p:cNvPr id="3" name="Content Placeholder 2">
+            <a:extLst>
+              <a:ext uri="{FF2B5EF4-FFF2-40B4-BE49-F238E27FC236}">
+                <a16:creationId xmlns:a16="http://schemas.microsoft.com/office/drawing/2014/main" id="{BA26B35D-435E-502C-A470-970406ED1F1C}"/>
+              </a:ext>
+            </a:extLst>
+          </p:cNvPr>
+          <p:cNvSpPr>
+            <a:spLocks noGrp="1"/>
+          </p:cNvSpPr>
+          <p:nvPr>
+            <p:ph idx="1"/>
+          </p:nvPr>
+        </p:nvSpPr>
+        <p:spPr>
+          <a:xfrm>
+            <a:off x="838200" y="2909731"/>
+            <a:ext cx="10515600" cy="2138258"/>
+          </a:xfrm>
+        </p:spPr>
+        <p:txBody>
+          <a:bodyPr>
+            <a:normAutofit/>
+          </a:bodyPr>
+          <a:lstStyle/>
+          <a:p>
+            <a:pPr marL="0" indent="0" algn="ctr" rtl="0">
+              <a:spcBef>
+                <a:spcPts val="0"/>
+              </a:spcBef>
+              <a:spcAft>
+                <a:spcPts val="0"/>
+              </a:spcAft>
+              <a:buNone/>
+            </a:pPr>
+            <a:r>
+              <a:rPr lang="en-US" sz="3600" b="0" i="0" u="none" strike="noStrike" dirty="0">
+                <a:effectLst/>
+                <a:latin typeface="League Spartan"/>
+              </a:rPr>
+              <a:t>Thank you. Please feel free to ask any questions. 😄</a:t>
+            </a:r>
+            <a:endParaRPr lang="en-US" sz="3600" b="0" dirty="0">
+              <a:effectLst/>
+            </a:endParaRPr>
+          </a:p>
+          <a:p>
+            <a:pPr marL="0" indent="0" algn="ctr">
+              <a:buNone/>
+            </a:pPr>
+            <a:endParaRPr lang="en-US" sz="3600" dirty="0"/>
+          </a:p>
+        </p:txBody>
+      </p:sp>
+    </p:spTree>
+    <p:extLst>
+      <p:ext uri="{BB962C8B-B14F-4D97-AF65-F5344CB8AC3E}">
+        <p14:creationId xmlns:p14="http://schemas.microsoft.com/office/powerpoint/2010/main" val="3584605405"/>
+      </p:ext>
+    </p:extLst>
+  </p:cSld>
+  <p:clrMapOvr>
+    <a:masterClrMapping/>
+  </p:clrMapOvr>
+</p:sld>
+</file>
+
 <file path=ppt/theme/theme1.xml><?xml version="1.0" encoding="utf-8"?>
 <a:theme xmlns:a="http://schemas.openxmlformats.org/drawingml/2006/main" name="نسق Office">
   <a:themeElements>

</xml_diff>